<commit_message>
updated reveal and 28 aug nbac minutes folder
</commit_message>
<xml_diff>
--- a/nbac-meeting-minutes/2025/28-aug-25/28 Aug 2025 NBAC Agenda .pptx
+++ b/nbac-meeting-minutes/2025/28-aug-25/28 Aug 2025 NBAC Agenda .pptx
@@ -179,7 +179,7 @@
   <pc:docChgLst>
     <pc:chgData name="Sullivan, Stephen M CTR JS J6 (USA)" userId="09533073-ba80-4ec6-aa29-c3f724b8aa56" providerId="ADAL" clId="{920C5EBF-6B6C-4434-A6C8-6C70AEE65699}"/>
     <pc:docChg chg="delSld modSld">
-      <pc:chgData name="Sullivan, Stephen M CTR JS J6 (USA)" userId="09533073-ba80-4ec6-aa29-c3f724b8aa56" providerId="ADAL" clId="{920C5EBF-6B6C-4434-A6C8-6C70AEE65699}" dt="2025-08-20T11:37:54.812" v="1" actId="20577"/>
+      <pc:chgData name="Sullivan, Stephen M CTR JS J6 (USA)" userId="09533073-ba80-4ec6-aa29-c3f724b8aa56" providerId="ADAL" clId="{920C5EBF-6B6C-4434-A6C8-6C70AEE65699}" dt="2025-08-20T16:35:17.456" v="2" actId="1076"/>
       <pc:docMkLst>
         <pc:docMk/>
       </pc:docMkLst>
@@ -204,6 +204,21 @@
           <pc:docMk/>
           <pc:sldMk cId="2632548611" sldId="141170244"/>
         </pc:sldMkLst>
+      </pc:sldChg>
+      <pc:sldChg chg="modSp mod">
+        <pc:chgData name="Sullivan, Stephen M CTR JS J6 (USA)" userId="09533073-ba80-4ec6-aa29-c3f724b8aa56" providerId="ADAL" clId="{920C5EBF-6B6C-4434-A6C8-6C70AEE65699}" dt="2025-08-20T16:35:17.456" v="2" actId="1076"/>
+        <pc:sldMkLst>
+          <pc:docMk/>
+          <pc:sldMk cId="1262787905" sldId="141170245"/>
+        </pc:sldMkLst>
+        <pc:spChg chg="mod">
+          <ac:chgData name="Sullivan, Stephen M CTR JS J6 (USA)" userId="09533073-ba80-4ec6-aa29-c3f724b8aa56" providerId="ADAL" clId="{920C5EBF-6B6C-4434-A6C8-6C70AEE65699}" dt="2025-08-20T16:35:17.456" v="2" actId="1076"/>
+          <ac:spMkLst>
+            <pc:docMk/>
+            <pc:sldMk cId="1262787905" sldId="141170245"/>
+            <ac:spMk id="3" creationId="{13528886-5A7B-C643-B9E4-D77A8143EDA9}"/>
+          </ac:spMkLst>
+        </pc:spChg>
       </pc:sldChg>
     </pc:docChg>
   </pc:docChgLst>
@@ -1909,14 +1924,14 @@
           </a:ln>
           <a:extLst>
             <a:ext uri="{909E8E84-426E-40dd-AFC4-6F175D3DCCD1}">
-              <a14:hiddenFill xmlns="" xmlns:a14="http://schemas.microsoft.com/office/drawing/2010/main">
+              <a14:hiddenFill xmlns:a14="http://schemas.microsoft.com/office/drawing/2010/main" xmlns="">
                 <a:solidFill>
                   <a:srgbClr val="FFFFFF"/>
                 </a:solidFill>
               </a14:hiddenFill>
             </a:ext>
             <a:ext uri="{91240B29-F687-4f45-9708-019B960494DF}">
-              <a14:hiddenLine xmlns="" xmlns:a14="http://schemas.microsoft.com/office/drawing/2010/main" w="9525">
+              <a14:hiddenLine xmlns:a14="http://schemas.microsoft.com/office/drawing/2010/main" xmlns="" w="9525">
                 <a:solidFill>
                   <a:srgbClr val="000000"/>
                 </a:solidFill>
@@ -10052,7 +10067,7 @@
         </p:nvSpPr>
         <p:spPr>
           <a:xfrm>
-            <a:off x="403047" y="685801"/>
+            <a:off x="403047" y="441708"/>
             <a:ext cx="5235753" cy="5486400"/>
           </a:xfrm>
         </p:spPr>
@@ -11752,6 +11767,12 @@
 </file>
 
 <file path=customXml/item2.xml><?xml version="1.0" encoding="utf-8"?>
+<p:properties xmlns:p="http://schemas.microsoft.com/office/2006/metadata/properties" xmlns:xsi="http://www.w3.org/2001/XMLSchema-instance" xmlns:pc="http://schemas.microsoft.com/office/infopath/2007/PartnerControls">
+  <documentManagement/>
+</p:properties>
+</file>
+
+<file path=customXml/item3.xml><?xml version="1.0" encoding="utf-8"?>
 <ct:contentTypeSchema xmlns:ct="http://schemas.microsoft.com/office/2006/metadata/contentType" xmlns:ma="http://schemas.microsoft.com/office/2006/metadata/properties/metaAttributes" ct:_="" ma:_="" ma:contentTypeName="Document" ma:contentTypeID="0x0101008E3FE027E793D141A4D0D4B43133F0A9" ma:contentTypeVersion="11" ma:contentTypeDescription="Create a new document." ma:contentTypeScope="" ma:versionID="ef0ff03645a81817586e79cdf8acc990">
   <xsd:schema xmlns:xsd="http://www.w3.org/2001/XMLSchema" xmlns:xs="http://www.w3.org/2001/XMLSchema" xmlns:p="http://schemas.microsoft.com/office/2006/metadata/properties" xmlns:ns3="5774b216-7350-4865-8b28-a80b4a7f0bbf" xmlns:ns4="668b5da2-bb96-4ca8-adfe-f026adba9ac0" targetNamespace="http://schemas.microsoft.com/office/2006/metadata/properties" ma:root="true" ma:fieldsID="f7951dfeee9e00cf5aead93b99a4360e" ns3:_="" ns4:_="">
     <xsd:import namespace="5774b216-7350-4865-8b28-a80b4a7f0bbf"/>
@@ -11960,12 +11981,6 @@
 </ct:contentTypeSchema>
 </file>
 
-<file path=customXml/item3.xml><?xml version="1.0" encoding="utf-8"?>
-<p:properties xmlns:p="http://schemas.microsoft.com/office/2006/metadata/properties" xmlns:xsi="http://www.w3.org/2001/XMLSchema-instance" xmlns:pc="http://schemas.microsoft.com/office/infopath/2007/PartnerControls">
-  <documentManagement/>
-</p:properties>
-</file>
-
 <file path=customXml/itemProps1.xml><?xml version="1.0" encoding="utf-8"?>
 <ds:datastoreItem xmlns:ds="http://schemas.openxmlformats.org/officeDocument/2006/customXml" ds:itemID="{64D6F7FA-A44B-4531-B619-52D10ADDC84A}">
   <ds:schemaRefs>
@@ -11975,6 +11990,23 @@
 </file>
 
 <file path=customXml/itemProps2.xml><?xml version="1.0" encoding="utf-8"?>
+<ds:datastoreItem xmlns:ds="http://schemas.openxmlformats.org/officeDocument/2006/customXml" ds:itemID="{0F3DBC4E-DD94-448E-80FB-F46647EDD91A}">
+  <ds:schemaRefs>
+    <ds:schemaRef ds:uri="http://schemas.microsoft.com/office/2006/metadata/properties"/>
+    <ds:schemaRef ds:uri="668b5da2-bb96-4ca8-adfe-f026adba9ac0"/>
+    <ds:schemaRef ds:uri="http://schemas.microsoft.com/office/2006/documentManagement/types"/>
+    <ds:schemaRef ds:uri="http://purl.org/dc/elements/1.1/"/>
+    <ds:schemaRef ds:uri="http://purl.org/dc/terms/"/>
+    <ds:schemaRef ds:uri="http://schemas.microsoft.com/office/infopath/2007/PartnerControls"/>
+    <ds:schemaRef ds:uri="http://purl.org/dc/dcmitype/"/>
+    <ds:schemaRef ds:uri="http://schemas.openxmlformats.org/package/2006/metadata/core-properties"/>
+    <ds:schemaRef ds:uri="5774b216-7350-4865-8b28-a80b4a7f0bbf"/>
+    <ds:schemaRef ds:uri="http://www.w3.org/XML/1998/namespace"/>
+  </ds:schemaRefs>
+</ds:datastoreItem>
+</file>
+
+<file path=customXml/itemProps3.xml><?xml version="1.0" encoding="utf-8"?>
 <ds:datastoreItem xmlns:ds="http://schemas.openxmlformats.org/officeDocument/2006/customXml" ds:itemID="{B0DEB80F-82C0-4107-A718-099EC7520D45}">
   <ds:schemaRefs>
     <ds:schemaRef ds:uri="http://schemas.microsoft.com/office/2006/metadata/contentType"/>
@@ -11993,23 +12025,6 @@
 </ds:datastoreItem>
 </file>
 
-<file path=customXml/itemProps3.xml><?xml version="1.0" encoding="utf-8"?>
-<ds:datastoreItem xmlns:ds="http://schemas.openxmlformats.org/officeDocument/2006/customXml" ds:itemID="{0F3DBC4E-DD94-448E-80FB-F46647EDD91A}">
-  <ds:schemaRefs>
-    <ds:schemaRef ds:uri="http://schemas.microsoft.com/office/2006/metadata/properties"/>
-    <ds:schemaRef ds:uri="668b5da2-bb96-4ca8-adfe-f026adba9ac0"/>
-    <ds:schemaRef ds:uri="http://schemas.microsoft.com/office/2006/documentManagement/types"/>
-    <ds:schemaRef ds:uri="http://purl.org/dc/elements/1.1/"/>
-    <ds:schemaRef ds:uri="http://purl.org/dc/terms/"/>
-    <ds:schemaRef ds:uri="http://schemas.microsoft.com/office/infopath/2007/PartnerControls"/>
-    <ds:schemaRef ds:uri="http://purl.org/dc/dcmitype/"/>
-    <ds:schemaRef ds:uri="http://schemas.openxmlformats.org/package/2006/metadata/core-properties"/>
-    <ds:schemaRef ds:uri="5774b216-7350-4865-8b28-a80b4a7f0bbf"/>
-    <ds:schemaRef ds:uri="http://www.w3.org/XML/1998/namespace"/>
-  </ds:schemaRefs>
-</ds:datastoreItem>
-</file>
-
 <file path=docMetadata/LabelInfo.xml><?xml version="1.0" encoding="utf-8"?>
 <clbl:labelList xmlns:clbl="http://schemas.microsoft.com/office/2020/mipLabelMetadata">
   <clbl:label id="{102d0191-eeae-4761-b1cb-1a83e86ef445}" enabled="0" method="" siteId="{102d0191-eeae-4761-b1cb-1a83e86ef445}" removed="1"/>

</xml_diff>